<commit_message>
arrumando o hostname ec2
</commit_message>
<xml_diff>
--- a/Documentação/Slide Final.pptx
+++ b/Documentação/Slide Final.pptx
@@ -10,13 +10,14 @@
     <p:sldId id="289" r:id="rId4"/>
     <p:sldId id="299" r:id="rId5"/>
     <p:sldId id="312" r:id="rId6"/>
-    <p:sldId id="284" r:id="rId7"/>
-    <p:sldId id="291" r:id="rId8"/>
+    <p:sldId id="291" r:id="rId7"/>
+    <p:sldId id="313" r:id="rId8"/>
     <p:sldId id="285" r:id="rId9"/>
-    <p:sldId id="311" r:id="rId10"/>
-    <p:sldId id="310" r:id="rId11"/>
-    <p:sldId id="292" r:id="rId12"/>
-    <p:sldId id="305" r:id="rId13"/>
+    <p:sldId id="310" r:id="rId10"/>
+    <p:sldId id="311" r:id="rId11"/>
+    <p:sldId id="284" r:id="rId12"/>
+    <p:sldId id="292" r:id="rId13"/>
+    <p:sldId id="305" r:id="rId14"/>
   </p:sldIdLst>
   <p:sldSz cx="12192000" cy="6858000"/>
   <p:notesSz cx="6858000" cy="9144000"/>
@@ -271,7 +272,7 @@
           <a:p>
             <a:fld id="{F50B35C2-D55D-43EC-A9F9-87B33DB15AB7}" type="datetimeFigureOut">
               <a:rPr lang="pt-BR" smtClean="0"/>
-              <a:t>05/12/2020</a:t>
+              <a:t>06/12/2020</a:t>
             </a:fld>
             <a:endParaRPr lang="pt-BR"/>
           </a:p>
@@ -439,7 +440,7 @@
           <a:p>
             <a:fld id="{F50B35C2-D55D-43EC-A9F9-87B33DB15AB7}" type="datetimeFigureOut">
               <a:rPr lang="pt-BR" smtClean="0"/>
-              <a:t>05/12/2020</a:t>
+              <a:t>06/12/2020</a:t>
             </a:fld>
             <a:endParaRPr lang="pt-BR"/>
           </a:p>
@@ -617,7 +618,7 @@
           <a:p>
             <a:fld id="{F50B35C2-D55D-43EC-A9F9-87B33DB15AB7}" type="datetimeFigureOut">
               <a:rPr lang="pt-BR" smtClean="0"/>
-              <a:t>05/12/2020</a:t>
+              <a:t>06/12/2020</a:t>
             </a:fld>
             <a:endParaRPr lang="pt-BR"/>
           </a:p>
@@ -785,7 +786,7 @@
           <a:p>
             <a:fld id="{F50B35C2-D55D-43EC-A9F9-87B33DB15AB7}" type="datetimeFigureOut">
               <a:rPr lang="pt-BR" smtClean="0"/>
-              <a:t>05/12/2020</a:t>
+              <a:t>06/12/2020</a:t>
             </a:fld>
             <a:endParaRPr lang="pt-BR"/>
           </a:p>
@@ -1030,7 +1031,7 @@
           <a:p>
             <a:fld id="{F50B35C2-D55D-43EC-A9F9-87B33DB15AB7}" type="datetimeFigureOut">
               <a:rPr lang="pt-BR" smtClean="0"/>
-              <a:t>05/12/2020</a:t>
+              <a:t>06/12/2020</a:t>
             </a:fld>
             <a:endParaRPr lang="pt-BR"/>
           </a:p>
@@ -1259,7 +1260,7 @@
           <a:p>
             <a:fld id="{F50B35C2-D55D-43EC-A9F9-87B33DB15AB7}" type="datetimeFigureOut">
               <a:rPr lang="pt-BR" smtClean="0"/>
-              <a:t>05/12/2020</a:t>
+              <a:t>06/12/2020</a:t>
             </a:fld>
             <a:endParaRPr lang="pt-BR"/>
           </a:p>
@@ -1623,7 +1624,7 @@
           <a:p>
             <a:fld id="{F50B35C2-D55D-43EC-A9F9-87B33DB15AB7}" type="datetimeFigureOut">
               <a:rPr lang="pt-BR" smtClean="0"/>
-              <a:t>05/12/2020</a:t>
+              <a:t>06/12/2020</a:t>
             </a:fld>
             <a:endParaRPr lang="pt-BR"/>
           </a:p>
@@ -1740,7 +1741,7 @@
           <a:p>
             <a:fld id="{F50B35C2-D55D-43EC-A9F9-87B33DB15AB7}" type="datetimeFigureOut">
               <a:rPr lang="pt-BR" smtClean="0"/>
-              <a:t>05/12/2020</a:t>
+              <a:t>06/12/2020</a:t>
             </a:fld>
             <a:endParaRPr lang="pt-BR"/>
           </a:p>
@@ -1835,7 +1836,7 @@
           <a:p>
             <a:fld id="{F50B35C2-D55D-43EC-A9F9-87B33DB15AB7}" type="datetimeFigureOut">
               <a:rPr lang="pt-BR" smtClean="0"/>
-              <a:t>05/12/2020</a:t>
+              <a:t>06/12/2020</a:t>
             </a:fld>
             <a:endParaRPr lang="pt-BR"/>
           </a:p>
@@ -2110,7 +2111,7 @@
           <a:p>
             <a:fld id="{F50B35C2-D55D-43EC-A9F9-87B33DB15AB7}" type="datetimeFigureOut">
               <a:rPr lang="pt-BR" smtClean="0"/>
-              <a:t>05/12/2020</a:t>
+              <a:t>06/12/2020</a:t>
             </a:fld>
             <a:endParaRPr lang="pt-BR"/>
           </a:p>
@@ -2362,7 +2363,7 @@
           <a:p>
             <a:fld id="{F50B35C2-D55D-43EC-A9F9-87B33DB15AB7}" type="datetimeFigureOut">
               <a:rPr lang="pt-BR" smtClean="0"/>
-              <a:t>05/12/2020</a:t>
+              <a:t>06/12/2020</a:t>
             </a:fld>
             <a:endParaRPr lang="pt-BR"/>
           </a:p>
@@ -2573,7 +2574,7 @@
           <a:p>
             <a:fld id="{F50B35C2-D55D-43EC-A9F9-87B33DB15AB7}" type="datetimeFigureOut">
               <a:rPr lang="pt-BR" smtClean="0"/>
-              <a:t>05/12/2020</a:t>
+              <a:t>06/12/2020</a:t>
             </a:fld>
             <a:endParaRPr lang="pt-BR"/>
           </a:p>
@@ -3277,8 +3278,8 @@
         </p:nvSpPr>
         <p:spPr>
           <a:xfrm>
-            <a:off x="838200" y="-160017"/>
-            <a:ext cx="10515600" cy="1325563"/>
+            <a:off x="838200" y="-19310"/>
+            <a:ext cx="10515600" cy="1213142"/>
           </a:xfrm>
           <a:prstGeom prst="rect">
             <a:avLst/>
@@ -3319,17 +3320,17 @@
                 </a:solidFill>
                 <a:latin typeface="Bariol Bold" panose="02000506040000020003" pitchFamily="2" charset="0"/>
               </a:rPr>
-              <a:t>Aplicação Java</a:t>
+              <a:t>Diagrama de Classe</a:t>
             </a:r>
           </a:p>
         </p:txBody>
       </p:sp>
       <p:pic>
         <p:nvPicPr>
-          <p:cNvPr id="4" name="Picture 2">
+          <p:cNvPr id="5" name="Picture 2">
             <a:extLst>
               <a:ext uri="{FF2B5EF4-FFF2-40B4-BE49-F238E27FC236}">
-                <a16:creationId xmlns:a16="http://schemas.microsoft.com/office/drawing/2014/main" id="{3CF36ED0-FCD8-45D8-A912-5D4DD5032DBE}"/>
+                <a16:creationId xmlns:a16="http://schemas.microsoft.com/office/drawing/2014/main" id="{5E6A065D-74B6-43C9-8951-4759FD99C85F}"/>
               </a:ext>
             </a:extLst>
           </p:cNvPr>
@@ -3376,7 +3377,7 @@
           <p:cNvPr id="2" name="Straight Arrow Connector 1">
             <a:extLst>
               <a:ext uri="{FF2B5EF4-FFF2-40B4-BE49-F238E27FC236}">
-                <a16:creationId xmlns:a16="http://schemas.microsoft.com/office/drawing/2014/main" id="{EF6676ED-9702-4820-B9D8-8B178C2BC9D8}"/>
+                <a16:creationId xmlns:a16="http://schemas.microsoft.com/office/drawing/2014/main" id="{102C7A15-5BE4-4E8E-826E-06C7E84CB27C}"/>
               </a:ext>
             </a:extLst>
           </p:cNvPr>
@@ -3387,8 +3388,8 @@
         </p:nvCxnSpPr>
         <p:spPr>
           <a:xfrm>
-            <a:off x="4187687" y="777737"/>
-            <a:ext cx="3697356" cy="0"/>
+            <a:off x="3737113" y="838200"/>
+            <a:ext cx="4717774" cy="0"/>
           </a:xfrm>
           <a:prstGeom prst="straightConnector1">
             <a:avLst/>
@@ -3416,22 +3417,34 @@
       </p:cxnSp>
       <p:pic>
         <p:nvPicPr>
-          <p:cNvPr id="3" name="Imagem 2"/>
+          <p:cNvPr id="8" name="Imagem 7" descr="Uma imagem contendo Linha do tempo&#10;&#10;Descrição gerada automaticamente">
+            <a:extLst>
+              <a:ext uri="{FF2B5EF4-FFF2-40B4-BE49-F238E27FC236}">
+                <a16:creationId xmlns:a16="http://schemas.microsoft.com/office/drawing/2014/main" id="{886D92C6-8ADC-4806-BC55-A75E6623F3AA}"/>
+              </a:ext>
+            </a:extLst>
+          </p:cNvPr>
           <p:cNvPicPr>
             <a:picLocks noChangeAspect="1"/>
           </p:cNvPicPr>
           <p:nvPr/>
         </p:nvPicPr>
         <p:blipFill>
-          <a:blip r:embed="rId3"/>
+          <a:blip r:embed="rId3" cstate="print">
+            <a:extLst>
+              <a:ext uri="{28A0092B-C50C-407E-A947-70E740481C1C}">
+                <a14:useLocalDpi xmlns:a14="http://schemas.microsoft.com/office/drawing/2010/main" val="0"/>
+              </a:ext>
+            </a:extLst>
+          </a:blip>
           <a:stretch>
             <a:fillRect/>
           </a:stretch>
         </p:blipFill>
         <p:spPr>
           <a:xfrm>
-            <a:off x="1842473" y="1165546"/>
-            <a:ext cx="8891789" cy="4327337"/>
+            <a:off x="1036125" y="979821"/>
+            <a:ext cx="10119749" cy="5878179"/>
           </a:xfrm>
           <a:prstGeom prst="rect">
             <a:avLst/>
@@ -3441,7 +3454,7 @@
     </p:spTree>
     <p:extLst>
       <p:ext uri="{BB962C8B-B14F-4D97-AF65-F5344CB8AC3E}">
-        <p14:creationId xmlns:p14="http://schemas.microsoft.com/office/powerpoint/2010/main" val="3553014712"/>
+        <p14:creationId xmlns:p14="http://schemas.microsoft.com/office/powerpoint/2010/main" val="1994396839"/>
       </p:ext>
     </p:extLst>
   </p:cSld>
@@ -3532,7 +3545,7 @@
                                           </p:stCondLst>
                                         </p:cTn>
                                         <p:tgtEl>
-                                          <p:spTgt spid="4"/>
+                                          <p:spTgt spid="5"/>
                                         </p:tgtEl>
                                         <p:attrNameLst>
                                           <p:attrName>style.visibility</p:attrName>
@@ -3546,7 +3559,7 @@
                                       <p:cBhvr>
                                         <p:cTn id="10" dur="500"/>
                                         <p:tgtEl>
-                                          <p:spTgt spid="4"/>
+                                          <p:spTgt spid="5"/>
                                         </p:tgtEl>
                                       </p:cBhvr>
                                     </p:animEffect>
@@ -3556,7 +3569,7 @@
                               <p:par>
                                 <p:cTn id="11" presetID="10" presetClass="entr" presetSubtype="0" fill="hold" nodeType="withEffect">
                                   <p:stCondLst>
-                                    <p:cond delay="0"/>
+                                    <p:cond delay="250"/>
                                   </p:stCondLst>
                                   <p:childTnLst>
                                     <p:set>
@@ -3582,41 +3595,6 @@
                                         <p:cTn id="13" dur="500"/>
                                         <p:tgtEl>
                                           <p:spTgt spid="2"/>
-                                        </p:tgtEl>
-                                      </p:cBhvr>
-                                    </p:animEffect>
-                                  </p:childTnLst>
-                                </p:cTn>
-                              </p:par>
-                              <p:par>
-                                <p:cTn id="14" presetID="10" presetClass="entr" presetSubtype="0" fill="hold" nodeType="withEffect">
-                                  <p:stCondLst>
-                                    <p:cond delay="0"/>
-                                  </p:stCondLst>
-                                  <p:childTnLst>
-                                    <p:set>
-                                      <p:cBhvr>
-                                        <p:cTn id="15" dur="1" fill="hold">
-                                          <p:stCondLst>
-                                            <p:cond delay="0"/>
-                                          </p:stCondLst>
-                                        </p:cTn>
-                                        <p:tgtEl>
-                                          <p:spTgt spid="3"/>
-                                        </p:tgtEl>
-                                        <p:attrNameLst>
-                                          <p:attrName>style.visibility</p:attrName>
-                                        </p:attrNameLst>
-                                      </p:cBhvr>
-                                      <p:to>
-                                        <p:strVal val="visible"/>
-                                      </p:to>
-                                    </p:set>
-                                    <p:animEffect transition="in" filter="fade">
-                                      <p:cBhvr>
-                                        <p:cTn id="16" dur="500"/>
-                                        <p:tgtEl>
-                                          <p:spTgt spid="3"/>
                                         </p:tgtEl>
                                       </p:cBhvr>
                                     </p:animEffect>
@@ -3658,6 +3636,544 @@
 </file>
 
 <file path=ppt/slides/slide11.xml><?xml version="1.0" encoding="utf-8"?>
+<p:sld xmlns:a="http://schemas.openxmlformats.org/drawingml/2006/main" xmlns:r="http://schemas.openxmlformats.org/officeDocument/2006/relationships" xmlns:p="http://schemas.openxmlformats.org/presentationml/2006/main">
+  <p:cSld>
+    <p:spTree>
+      <p:nvGrpSpPr>
+        <p:cNvPr id="1" name=""/>
+        <p:cNvGrpSpPr/>
+        <p:nvPr/>
+      </p:nvGrpSpPr>
+      <p:grpSpPr>
+        <a:xfrm>
+          <a:off x="0" y="0"/>
+          <a:ext cx="0" cy="0"/>
+          <a:chOff x="0" y="0"/>
+          <a:chExt cx="0" cy="0"/>
+        </a:xfrm>
+      </p:grpSpPr>
+      <p:cxnSp>
+        <p:nvCxnSpPr>
+          <p:cNvPr id="4" name="Straight Arrow Connector 3">
+            <a:extLst>
+              <a:ext uri="{FF2B5EF4-FFF2-40B4-BE49-F238E27FC236}">
+                <a16:creationId xmlns:a16="http://schemas.microsoft.com/office/drawing/2014/main" id="{2E47AAF4-0703-407A-9375-DE4A2497442E}"/>
+              </a:ext>
+            </a:extLst>
+          </p:cNvPr>
+          <p:cNvCxnSpPr/>
+          <p:nvPr/>
+        </p:nvCxnSpPr>
+        <p:spPr>
+          <a:xfrm>
+            <a:off x="4238625" y="895350"/>
+            <a:ext cx="3705225" cy="0"/>
+          </a:xfrm>
+          <a:prstGeom prst="straightConnector1">
+            <a:avLst/>
+          </a:prstGeom>
+          <a:ln>
+            <a:solidFill>
+              <a:srgbClr val="C00000"/>
+            </a:solidFill>
+          </a:ln>
+        </p:spPr>
+        <p:style>
+          <a:lnRef idx="3">
+            <a:schemeClr val="dk1"/>
+          </a:lnRef>
+          <a:fillRef idx="0">
+            <a:schemeClr val="dk1"/>
+          </a:fillRef>
+          <a:effectRef idx="2">
+            <a:schemeClr val="dk1"/>
+          </a:effectRef>
+          <a:fontRef idx="minor">
+            <a:schemeClr val="tx1"/>
+          </a:fontRef>
+        </p:style>
+      </p:cxnSp>
+      <p:sp>
+        <p:nvSpPr>
+          <p:cNvPr id="7" name="Título 1">
+            <a:extLst>
+              <a:ext uri="{FF2B5EF4-FFF2-40B4-BE49-F238E27FC236}">
+                <a16:creationId xmlns:a16="http://schemas.microsoft.com/office/drawing/2014/main" id="{99F76FBE-1BC2-4EE6-B90A-22263BF7BDCD}"/>
+              </a:ext>
+            </a:extLst>
+          </p:cNvPr>
+          <p:cNvSpPr txBox="1">
+            <a:spLocks/>
+          </p:cNvSpPr>
+          <p:nvPr/>
+        </p:nvSpPr>
+        <p:spPr>
+          <a:xfrm>
+            <a:off x="838199" y="0"/>
+            <a:ext cx="10515600" cy="1325563"/>
+          </a:xfrm>
+          <a:prstGeom prst="rect">
+            <a:avLst/>
+          </a:prstGeom>
+        </p:spPr>
+        <p:txBody>
+          <a:bodyPr vert="horz" lIns="91440" tIns="45720" rIns="91440" bIns="45720" rtlCol="0" anchor="ctr">
+            <a:normAutofit/>
+          </a:bodyPr>
+          <a:lstStyle>
+            <a:lvl1pPr algn="l" defTabSz="914400" rtl="0" eaLnBrk="1" latinLnBrk="0" hangingPunct="1">
+              <a:lnSpc>
+                <a:spcPct val="90000"/>
+              </a:lnSpc>
+              <a:spcBef>
+                <a:spcPct val="0"/>
+              </a:spcBef>
+              <a:buNone/>
+              <a:defRPr sz="4400" kern="1200">
+                <a:solidFill>
+                  <a:schemeClr val="tx1"/>
+                </a:solidFill>
+                <a:latin typeface="+mj-lt"/>
+                <a:ea typeface="+mj-ea"/>
+                <a:cs typeface="+mj-cs"/>
+              </a:defRPr>
+            </a:lvl1pPr>
+          </a:lstStyle>
+          <a:p>
+            <a:pPr algn="ctr"/>
+            <a:r>
+              <a:rPr lang="pt-BR" dirty="0">
+                <a:solidFill>
+                  <a:schemeClr val="tx1">
+                    <a:lumMod val="75000"/>
+                    <a:lumOff val="25000"/>
+                  </a:schemeClr>
+                </a:solidFill>
+                <a:latin typeface="Bariol Bold" panose="02000506040000020003" pitchFamily="2" charset="0"/>
+              </a:rPr>
+              <a:t>Modelo Lógico</a:t>
+            </a:r>
+          </a:p>
+        </p:txBody>
+      </p:sp>
+      <p:pic>
+        <p:nvPicPr>
+          <p:cNvPr id="3" name="Picture 2">
+            <a:extLst>
+              <a:ext uri="{FF2B5EF4-FFF2-40B4-BE49-F238E27FC236}">
+                <a16:creationId xmlns:a16="http://schemas.microsoft.com/office/drawing/2014/main" id="{5C89B846-E8B4-41E5-A2FD-3C9F96F43158}"/>
+              </a:ext>
+            </a:extLst>
+          </p:cNvPr>
+          <p:cNvPicPr>
+            <a:picLocks noChangeAspect="1" noChangeArrowheads="1"/>
+          </p:cNvPicPr>
+          <p:nvPr/>
+        </p:nvPicPr>
+        <p:blipFill>
+          <a:blip r:embed="rId2" cstate="print">
+            <a:extLst>
+              <a:ext uri="{28A0092B-C50C-407E-A947-70E740481C1C}">
+                <a14:useLocalDpi xmlns:a14="http://schemas.microsoft.com/office/drawing/2010/main" val="0"/>
+              </a:ext>
+            </a:extLst>
+          </a:blip>
+          <a:srcRect/>
+          <a:stretch>
+            <a:fillRect/>
+          </a:stretch>
+        </p:blipFill>
+        <p:spPr bwMode="auto">
+          <a:xfrm>
+            <a:off x="10734262" y="6232246"/>
+            <a:ext cx="1143368" cy="473355"/>
+          </a:xfrm>
+          <a:prstGeom prst="rect">
+            <a:avLst/>
+          </a:prstGeom>
+          <a:noFill/>
+          <a:extLst>
+            <a:ext uri="{909E8E84-426E-40DD-AFC4-6F175D3DCCD1}">
+              <a14:hiddenFill xmlns:a14="http://schemas.microsoft.com/office/drawing/2010/main">
+                <a:solidFill>
+                  <a:srgbClr val="FFFFFF"/>
+                </a:solidFill>
+              </a14:hiddenFill>
+            </a:ext>
+          </a:extLst>
+        </p:spPr>
+      </p:pic>
+      <p:pic>
+        <p:nvPicPr>
+          <p:cNvPr id="5" name="Imagem 4" descr="Desenho de uma pessoa&#10;&#10;Descrição gerada automaticamente">
+            <a:extLst>
+              <a:ext uri="{FF2B5EF4-FFF2-40B4-BE49-F238E27FC236}">
+                <a16:creationId xmlns:a16="http://schemas.microsoft.com/office/drawing/2014/main" id="{65B6D792-5394-44C7-88F8-DC482A934804}"/>
+              </a:ext>
+            </a:extLst>
+          </p:cNvPr>
+          <p:cNvPicPr>
+            <a:picLocks noChangeAspect="1"/>
+          </p:cNvPicPr>
+          <p:nvPr/>
+        </p:nvPicPr>
+        <p:blipFill>
+          <a:blip r:embed="rId3" cstate="print">
+            <a:extLst>
+              <a:ext uri="{28A0092B-C50C-407E-A947-70E740481C1C}">
+                <a14:useLocalDpi xmlns:a14="http://schemas.microsoft.com/office/drawing/2010/main" val="0"/>
+              </a:ext>
+            </a:extLst>
+          </a:blip>
+          <a:stretch>
+            <a:fillRect/>
+          </a:stretch>
+        </p:blipFill>
+        <p:spPr>
+          <a:xfrm>
+            <a:off x="314370" y="4245753"/>
+            <a:ext cx="3084827" cy="2223170"/>
+          </a:xfrm>
+          <a:prstGeom prst="rect">
+            <a:avLst/>
+          </a:prstGeom>
+        </p:spPr>
+      </p:pic>
+      <p:sp>
+        <p:nvSpPr>
+          <p:cNvPr id="8" name="AutoShape 4">
+            <a:extLst>
+              <a:ext uri="{FF2B5EF4-FFF2-40B4-BE49-F238E27FC236}">
+                <a16:creationId xmlns:a16="http://schemas.microsoft.com/office/drawing/2014/main" id="{CBC49F37-024F-43BA-BF41-65835263DDCC}"/>
+              </a:ext>
+            </a:extLst>
+          </p:cNvPr>
+          <p:cNvSpPr>
+            <a:spLocks noChangeAspect="1" noChangeArrowheads="1"/>
+          </p:cNvSpPr>
+          <p:nvPr/>
+        </p:nvSpPr>
+        <p:spPr bwMode="auto">
+          <a:xfrm>
+            <a:off x="5943600" y="3276600"/>
+            <a:ext cx="304800" cy="304800"/>
+          </a:xfrm>
+          <a:prstGeom prst="rect">
+            <a:avLst/>
+          </a:prstGeom>
+          <a:noFill/>
+          <a:extLst>
+            <a:ext uri="{909E8E84-426E-40DD-AFC4-6F175D3DCCD1}">
+              <a14:hiddenFill xmlns:a14="http://schemas.microsoft.com/office/drawing/2010/main">
+                <a:solidFill>
+                  <a:srgbClr val="FFFFFF"/>
+                </a:solidFill>
+              </a14:hiddenFill>
+            </a:ext>
+          </a:extLst>
+        </p:spPr>
+        <p:txBody>
+          <a:bodyPr vert="horz" wrap="square" lIns="91440" tIns="45720" rIns="91440" bIns="45720" numCol="1" anchor="t" anchorCtr="0" compatLnSpc="1">
+            <a:prstTxWarp prst="textNoShape">
+              <a:avLst/>
+            </a:prstTxWarp>
+          </a:bodyPr>
+          <a:lstStyle/>
+          <a:p>
+            <a:endParaRPr lang="pt-BR"/>
+          </a:p>
+        </p:txBody>
+      </p:sp>
+      <p:pic>
+        <p:nvPicPr>
+          <p:cNvPr id="10" name="Imagem 9" descr="Diagrama&#10;&#10;Descrição gerada automaticamente">
+            <a:extLst>
+              <a:ext uri="{FF2B5EF4-FFF2-40B4-BE49-F238E27FC236}">
+                <a16:creationId xmlns:a16="http://schemas.microsoft.com/office/drawing/2014/main" id="{EC31F9B0-BA3A-445B-901B-FC2332FEF663}"/>
+              </a:ext>
+            </a:extLst>
+          </p:cNvPr>
+          <p:cNvPicPr>
+            <a:picLocks noChangeAspect="1"/>
+          </p:cNvPicPr>
+          <p:nvPr/>
+        </p:nvPicPr>
+        <p:blipFill rotWithShape="1">
+          <a:blip r:embed="rId4">
+            <a:extLst>
+              <a:ext uri="{28A0092B-C50C-407E-A947-70E740481C1C}">
+                <a14:useLocalDpi xmlns:a14="http://schemas.microsoft.com/office/drawing/2010/main" val="0"/>
+              </a:ext>
+            </a:extLst>
+          </a:blip>
+          <a:srcRect t="488"/>
+          <a:stretch/>
+        </p:blipFill>
+        <p:spPr>
+          <a:xfrm>
+            <a:off x="3021496" y="1263653"/>
+            <a:ext cx="6705600" cy="5260624"/>
+          </a:xfrm>
+          <a:prstGeom prst="rect">
+            <a:avLst/>
+          </a:prstGeom>
+        </p:spPr>
+      </p:pic>
+    </p:spTree>
+    <p:extLst>
+      <p:ext uri="{BB962C8B-B14F-4D97-AF65-F5344CB8AC3E}">
+        <p14:creationId xmlns:p14="http://schemas.microsoft.com/office/powerpoint/2010/main" val="386722973"/>
+      </p:ext>
+    </p:extLst>
+  </p:cSld>
+  <p:clrMapOvr>
+    <a:masterClrMapping/>
+  </p:clrMapOvr>
+  <mc:AlternateContent xmlns:mc="http://schemas.openxmlformats.org/markup-compatibility/2006" xmlns:p14="http://schemas.microsoft.com/office/powerpoint/2010/main">
+    <mc:Choice Requires="p14">
+      <p:transition spd="med" p14:dur="700">
+        <p:fade/>
+      </p:transition>
+    </mc:Choice>
+    <mc:Fallback xmlns="">
+      <p:transition spd="med">
+        <p:fade/>
+      </p:transition>
+    </mc:Fallback>
+  </mc:AlternateContent>
+  <p:timing>
+    <p:tnLst>
+      <p:par>
+        <p:cTn id="1" dur="indefinite" restart="never" nodeType="tmRoot">
+          <p:childTnLst>
+            <p:seq concurrent="1" nextAc="seek">
+              <p:cTn id="2" dur="indefinite" nodeType="mainSeq">
+                <p:childTnLst>
+                  <p:par>
+                    <p:cTn id="3" fill="hold">
+                      <p:stCondLst>
+                        <p:cond delay="indefinite"/>
+                        <p:cond evt="onBegin" delay="0">
+                          <p:tn val="2"/>
+                        </p:cond>
+                      </p:stCondLst>
+                      <p:childTnLst>
+                        <p:par>
+                          <p:cTn id="4" fill="hold">
+                            <p:stCondLst>
+                              <p:cond delay="0"/>
+                            </p:stCondLst>
+                            <p:childTnLst>
+                              <p:par>
+                                <p:cTn id="5" presetID="10" presetClass="entr" presetSubtype="0" fill="hold" grpId="0" nodeType="withEffect">
+                                  <p:stCondLst>
+                                    <p:cond delay="0"/>
+                                  </p:stCondLst>
+                                  <p:childTnLst>
+                                    <p:set>
+                                      <p:cBhvr>
+                                        <p:cTn id="6" dur="1" fill="hold">
+                                          <p:stCondLst>
+                                            <p:cond delay="0"/>
+                                          </p:stCondLst>
+                                        </p:cTn>
+                                        <p:tgtEl>
+                                          <p:spTgt spid="7"/>
+                                        </p:tgtEl>
+                                        <p:attrNameLst>
+                                          <p:attrName>style.visibility</p:attrName>
+                                        </p:attrNameLst>
+                                      </p:cBhvr>
+                                      <p:to>
+                                        <p:strVal val="visible"/>
+                                      </p:to>
+                                    </p:set>
+                                    <p:animEffect transition="in" filter="fade">
+                                      <p:cBhvr>
+                                        <p:cTn id="7" dur="500"/>
+                                        <p:tgtEl>
+                                          <p:spTgt spid="7"/>
+                                        </p:tgtEl>
+                                      </p:cBhvr>
+                                    </p:animEffect>
+                                  </p:childTnLst>
+                                </p:cTn>
+                              </p:par>
+                              <p:par>
+                                <p:cTn id="8" presetID="10" presetClass="entr" presetSubtype="0" fill="hold" nodeType="withEffect">
+                                  <p:stCondLst>
+                                    <p:cond delay="0"/>
+                                  </p:stCondLst>
+                                  <p:childTnLst>
+                                    <p:set>
+                                      <p:cBhvr>
+                                        <p:cTn id="9" dur="1" fill="hold">
+                                          <p:stCondLst>
+                                            <p:cond delay="0"/>
+                                          </p:stCondLst>
+                                        </p:cTn>
+                                        <p:tgtEl>
+                                          <p:spTgt spid="3"/>
+                                        </p:tgtEl>
+                                        <p:attrNameLst>
+                                          <p:attrName>style.visibility</p:attrName>
+                                        </p:attrNameLst>
+                                      </p:cBhvr>
+                                      <p:to>
+                                        <p:strVal val="visible"/>
+                                      </p:to>
+                                    </p:set>
+                                    <p:animEffect transition="in" filter="fade">
+                                      <p:cBhvr>
+                                        <p:cTn id="10" dur="500"/>
+                                        <p:tgtEl>
+                                          <p:spTgt spid="3"/>
+                                        </p:tgtEl>
+                                      </p:cBhvr>
+                                    </p:animEffect>
+                                  </p:childTnLst>
+                                </p:cTn>
+                              </p:par>
+                              <p:par>
+                                <p:cTn id="11" presetID="10" presetClass="entr" presetSubtype="0" fill="hold" nodeType="withEffect">
+                                  <p:stCondLst>
+                                    <p:cond delay="250"/>
+                                  </p:stCondLst>
+                                  <p:childTnLst>
+                                    <p:set>
+                                      <p:cBhvr>
+                                        <p:cTn id="12" dur="1" fill="hold">
+                                          <p:stCondLst>
+                                            <p:cond delay="0"/>
+                                          </p:stCondLst>
+                                        </p:cTn>
+                                        <p:tgtEl>
+                                          <p:spTgt spid="5"/>
+                                        </p:tgtEl>
+                                        <p:attrNameLst>
+                                          <p:attrName>style.visibility</p:attrName>
+                                        </p:attrNameLst>
+                                      </p:cBhvr>
+                                      <p:to>
+                                        <p:strVal val="visible"/>
+                                      </p:to>
+                                    </p:set>
+                                    <p:animEffect transition="in" filter="fade">
+                                      <p:cBhvr>
+                                        <p:cTn id="13" dur="500"/>
+                                        <p:tgtEl>
+                                          <p:spTgt spid="5"/>
+                                        </p:tgtEl>
+                                      </p:cBhvr>
+                                    </p:animEffect>
+                                  </p:childTnLst>
+                                </p:cTn>
+                              </p:par>
+                              <p:par>
+                                <p:cTn id="14" presetID="10" presetClass="entr" presetSubtype="0" fill="hold" nodeType="withEffect">
+                                  <p:stCondLst>
+                                    <p:cond delay="250"/>
+                                  </p:stCondLst>
+                                  <p:childTnLst>
+                                    <p:set>
+                                      <p:cBhvr>
+                                        <p:cTn id="15" dur="1" fill="hold">
+                                          <p:stCondLst>
+                                            <p:cond delay="0"/>
+                                          </p:stCondLst>
+                                        </p:cTn>
+                                        <p:tgtEl>
+                                          <p:spTgt spid="4"/>
+                                        </p:tgtEl>
+                                        <p:attrNameLst>
+                                          <p:attrName>style.visibility</p:attrName>
+                                        </p:attrNameLst>
+                                      </p:cBhvr>
+                                      <p:to>
+                                        <p:strVal val="visible"/>
+                                      </p:to>
+                                    </p:set>
+                                    <p:animEffect transition="in" filter="fade">
+                                      <p:cBhvr>
+                                        <p:cTn id="16" dur="500"/>
+                                        <p:tgtEl>
+                                          <p:spTgt spid="4"/>
+                                        </p:tgtEl>
+                                      </p:cBhvr>
+                                    </p:animEffect>
+                                  </p:childTnLst>
+                                </p:cTn>
+                              </p:par>
+                              <p:par>
+                                <p:cTn id="17" presetID="10" presetClass="entr" presetSubtype="0" fill="hold" nodeType="withEffect">
+                                  <p:stCondLst>
+                                    <p:cond delay="250"/>
+                                  </p:stCondLst>
+                                  <p:childTnLst>
+                                    <p:set>
+                                      <p:cBhvr>
+                                        <p:cTn id="18" dur="1" fill="hold">
+                                          <p:stCondLst>
+                                            <p:cond delay="0"/>
+                                          </p:stCondLst>
+                                        </p:cTn>
+                                        <p:tgtEl>
+                                          <p:spTgt spid="10"/>
+                                        </p:tgtEl>
+                                        <p:attrNameLst>
+                                          <p:attrName>style.visibility</p:attrName>
+                                        </p:attrNameLst>
+                                      </p:cBhvr>
+                                      <p:to>
+                                        <p:strVal val="visible"/>
+                                      </p:to>
+                                    </p:set>
+                                    <p:animEffect transition="in" filter="fade">
+                                      <p:cBhvr>
+                                        <p:cTn id="19" dur="500"/>
+                                        <p:tgtEl>
+                                          <p:spTgt spid="10"/>
+                                        </p:tgtEl>
+                                      </p:cBhvr>
+                                    </p:animEffect>
+                                  </p:childTnLst>
+                                </p:cTn>
+                              </p:par>
+                            </p:childTnLst>
+                          </p:cTn>
+                        </p:par>
+                      </p:childTnLst>
+                    </p:cTn>
+                  </p:par>
+                </p:childTnLst>
+              </p:cTn>
+              <p:prevCondLst>
+                <p:cond evt="onPrev" delay="0">
+                  <p:tgtEl>
+                    <p:sldTgt/>
+                  </p:tgtEl>
+                </p:cond>
+              </p:prevCondLst>
+              <p:nextCondLst>
+                <p:cond evt="onNext" delay="0">
+                  <p:tgtEl>
+                    <p:sldTgt/>
+                  </p:tgtEl>
+                </p:cond>
+              </p:nextCondLst>
+            </p:seq>
+          </p:childTnLst>
+        </p:cTn>
+      </p:par>
+    </p:tnLst>
+    <p:bldLst>
+      <p:bldP spid="7" grpId="0"/>
+    </p:bldLst>
+  </p:timing>
+</p:sld>
+</file>
+
+<file path=ppt/slides/slide12.xml><?xml version="1.0" encoding="utf-8"?>
 <p:sld xmlns:a="http://schemas.openxmlformats.org/drawingml/2006/main" xmlns:r="http://schemas.openxmlformats.org/officeDocument/2006/relationships" xmlns:p="http://schemas.openxmlformats.org/presentationml/2006/main">
   <p:cSld>
     <p:spTree>
@@ -4080,7 +4596,7 @@
 </p:sld>
 </file>
 
-<file path=ppt/slides/slide12.xml><?xml version="1.0" encoding="utf-8"?>
+<file path=ppt/slides/slide13.xml><?xml version="1.0" encoding="utf-8"?>
 <p:sld xmlns:a="http://schemas.openxmlformats.org/drawingml/2006/main" xmlns:r="http://schemas.openxmlformats.org/officeDocument/2006/relationships" xmlns:p="http://schemas.openxmlformats.org/presentationml/2006/main">
   <p:cSld>
     <p:spTree>
@@ -6203,15 +6719,15 @@
         </p:nvSpPr>
         <p:spPr>
           <a:xfrm>
-            <a:off x="901563" y="2190677"/>
-            <a:ext cx="4900751" cy="1738063"/>
+            <a:off x="901563" y="2190676"/>
+            <a:ext cx="4900751" cy="3600192"/>
           </a:xfrm>
           <a:prstGeom prst="rect">
             <a:avLst/>
           </a:prstGeom>
         </p:spPr>
         <p:txBody>
-          <a:bodyPr vert="horz" lIns="91440" tIns="45720" rIns="91440" bIns="45720" rtlCol="0" anchor="b">
+          <a:bodyPr vert="horz" lIns="91440" tIns="45720" rIns="91440" bIns="45720" rtlCol="0" anchor="t">
             <a:noAutofit/>
           </a:bodyPr>
           <a:lstStyle>
@@ -6261,6 +6777,75 @@
               </a:rPr>
               <a:t>Necessidade de uma ferramenta;</a:t>
             </a:r>
+          </a:p>
+          <a:p>
+            <a:pPr marL="285750" indent="-285750">
+              <a:buFont typeface="Wingdings" panose="05000000000000000000" pitchFamily="2" charset="2"/>
+              <a:buChar char="ü"/>
+            </a:pPr>
+            <a:endParaRPr lang="pt-BR" sz="2800" dirty="0">
+              <a:latin typeface="Bariol Bold" panose="02000506040000020003"/>
+            </a:endParaRPr>
+          </a:p>
+          <a:p>
+            <a:pPr marL="285750" indent="-285750">
+              <a:buFont typeface="Wingdings" panose="05000000000000000000" pitchFamily="2" charset="2"/>
+              <a:buChar char="ü"/>
+            </a:pPr>
+            <a:r>
+              <a:rPr lang="pt-BR" sz="2800" dirty="0">
+                <a:latin typeface="Bariol Bold" panose="02000506040000020003"/>
+              </a:rPr>
+              <a:t>Monitoramento;</a:t>
+            </a:r>
+          </a:p>
+          <a:p>
+            <a:pPr marL="285750" indent="-285750">
+              <a:buFont typeface="Wingdings" panose="05000000000000000000" pitchFamily="2" charset="2"/>
+              <a:buChar char="ü"/>
+            </a:pPr>
+            <a:endParaRPr lang="pt-BR" sz="2800" dirty="0">
+              <a:latin typeface="Bariol Bold" panose="02000506040000020003"/>
+            </a:endParaRPr>
+          </a:p>
+          <a:p>
+            <a:pPr marL="285750" indent="-285750">
+              <a:buFont typeface="Wingdings" panose="05000000000000000000" pitchFamily="2" charset="2"/>
+              <a:buChar char="ü"/>
+            </a:pPr>
+            <a:r>
+              <a:rPr lang="pt-BR" sz="2800" dirty="0">
+                <a:latin typeface="Bariol Bold" panose="02000506040000020003"/>
+              </a:rPr>
+              <a:t>Funcionários desmotivados;</a:t>
+            </a:r>
+          </a:p>
+          <a:p>
+            <a:pPr marL="285750" indent="-285750">
+              <a:buFont typeface="Wingdings" panose="05000000000000000000" pitchFamily="2" charset="2"/>
+              <a:buChar char="ü"/>
+            </a:pPr>
+            <a:endParaRPr lang="pt-BR" sz="2800" dirty="0">
+              <a:latin typeface="Bariol Bold" panose="02000506040000020003"/>
+            </a:endParaRPr>
+          </a:p>
+          <a:p>
+            <a:pPr marL="285750" indent="-285750">
+              <a:buFont typeface="Wingdings" panose="05000000000000000000" pitchFamily="2" charset="2"/>
+              <a:buChar char="ü"/>
+            </a:pPr>
+            <a:endParaRPr lang="pt-BR" sz="2800" dirty="0">
+              <a:latin typeface="Bariol Bold" panose="02000506040000020003"/>
+            </a:endParaRPr>
+          </a:p>
+          <a:p>
+            <a:pPr marL="285750" indent="-285750">
+              <a:buFont typeface="Wingdings" panose="05000000000000000000" pitchFamily="2" charset="2"/>
+              <a:buChar char="ü"/>
+            </a:pPr>
+            <a:endParaRPr lang="pt-BR" sz="2800" dirty="0">
+              <a:latin typeface="Bariol Bold" panose="02000506040000020003"/>
+            </a:endParaRPr>
           </a:p>
         </p:txBody>
       </p:sp>
@@ -7536,20 +8121,22 @@
       </p:grpSpPr>
       <p:cxnSp>
         <p:nvCxnSpPr>
-          <p:cNvPr id="4" name="Straight Arrow Connector 3">
+          <p:cNvPr id="2" name="Straight Arrow Connector 1">
             <a:extLst>
               <a:ext uri="{FF2B5EF4-FFF2-40B4-BE49-F238E27FC236}">
-                <a16:creationId xmlns:a16="http://schemas.microsoft.com/office/drawing/2014/main" id="{2E47AAF4-0703-407A-9375-DE4A2497442E}"/>
+                <a16:creationId xmlns:a16="http://schemas.microsoft.com/office/drawing/2014/main" id="{E8D38C0A-F3C1-4051-ABE3-35FA8150390A}"/>
               </a:ext>
             </a:extLst>
           </p:cNvPr>
-          <p:cNvCxnSpPr/>
+          <p:cNvCxnSpPr>
+            <a:cxnSpLocks/>
+          </p:cNvCxnSpPr>
           <p:nvPr/>
         </p:nvCxnSpPr>
         <p:spPr>
           <a:xfrm>
-            <a:off x="4238625" y="895350"/>
-            <a:ext cx="3705225" cy="0"/>
+            <a:off x="3299198" y="1162465"/>
+            <a:ext cx="4956906" cy="0"/>
           </a:xfrm>
           <a:prstGeom prst="straightConnector1">
             <a:avLst/>
@@ -7591,8 +8178,8 @@
         </p:nvSpPr>
         <p:spPr>
           <a:xfrm>
-            <a:off x="838199" y="0"/>
-            <a:ext cx="10515600" cy="1325563"/>
+            <a:off x="3299198" y="220686"/>
+            <a:ext cx="5069862" cy="1325563"/>
           </a:xfrm>
           <a:prstGeom prst="rect">
             <a:avLst/>
@@ -7625,25 +8212,64 @@
             <a:pPr algn="ctr"/>
             <a:r>
               <a:rPr lang="pt-BR" dirty="0">
-                <a:solidFill>
-                  <a:schemeClr val="tx1">
-                    <a:lumMod val="75000"/>
-                    <a:lumOff val="25000"/>
-                  </a:schemeClr>
-                </a:solidFill>
-                <a:latin typeface="Bariol Bold" panose="02000506040000020003" pitchFamily="2" charset="0"/>
+                <a:latin typeface="Bariol Bold" panose="02000506040000020003"/>
               </a:rPr>
-              <a:t>Modelo Lógico</a:t>
+              <a:t>Pausas – NR-17</a:t>
             </a:r>
+            <a:endParaRPr lang="pt-BR" dirty="0">
+              <a:solidFill>
+                <a:schemeClr val="tx1">
+                  <a:lumMod val="75000"/>
+                  <a:lumOff val="25000"/>
+                </a:schemeClr>
+              </a:solidFill>
+              <a:latin typeface="Bariol Bold" panose="02000506040000020003" pitchFamily="2" charset="0"/>
+            </a:endParaRPr>
           </a:p>
         </p:txBody>
       </p:sp>
       <p:pic>
         <p:nvPicPr>
-          <p:cNvPr id="3" name="Picture 2">
+          <p:cNvPr id="3" name="Imagem 2" descr="Uma imagem contendo mesa, atletismo&#10;&#10;Descrição gerada automaticamente">
             <a:extLst>
               <a:ext uri="{FF2B5EF4-FFF2-40B4-BE49-F238E27FC236}">
-                <a16:creationId xmlns:a16="http://schemas.microsoft.com/office/drawing/2014/main" id="{5C89B846-E8B4-41E5-A2FD-3C9F96F43158}"/>
+                <a16:creationId xmlns:a16="http://schemas.microsoft.com/office/drawing/2014/main" id="{4F1DEA53-EAA9-41BE-AAAD-67147C20EFA3}"/>
+              </a:ext>
+            </a:extLst>
+          </p:cNvPr>
+          <p:cNvPicPr>
+            <a:picLocks noChangeAspect="1"/>
+          </p:cNvPicPr>
+          <p:nvPr/>
+        </p:nvPicPr>
+        <p:blipFill>
+          <a:blip r:embed="rId2">
+            <a:extLst>
+              <a:ext uri="{28A0092B-C50C-407E-A947-70E740481C1C}">
+                <a14:useLocalDpi xmlns:a14="http://schemas.microsoft.com/office/drawing/2010/main" val="0"/>
+              </a:ext>
+            </a:extLst>
+          </a:blip>
+          <a:stretch>
+            <a:fillRect/>
+          </a:stretch>
+        </p:blipFill>
+        <p:spPr>
+          <a:xfrm>
+            <a:off x="6574128" y="1470532"/>
+            <a:ext cx="5435201" cy="4221565"/>
+          </a:xfrm>
+          <a:prstGeom prst="rect">
+            <a:avLst/>
+          </a:prstGeom>
+        </p:spPr>
+      </p:pic>
+      <p:pic>
+        <p:nvPicPr>
+          <p:cNvPr id="4" name="Picture 2">
+            <a:extLst>
+              <a:ext uri="{FF2B5EF4-FFF2-40B4-BE49-F238E27FC236}">
+                <a16:creationId xmlns:a16="http://schemas.microsoft.com/office/drawing/2014/main" id="{D63799FE-FD58-46C7-8DD5-1902EEB7FE5C}"/>
               </a:ext>
             </a:extLst>
           </p:cNvPr>
@@ -7653,7 +8279,7 @@
           <p:nvPr/>
         </p:nvPicPr>
         <p:blipFill>
-          <a:blip r:embed="rId2" cstate="print">
+          <a:blip r:embed="rId3" cstate="print">
             <a:extLst>
               <a:ext uri="{28A0092B-C50C-407E-A947-70E740481C1C}">
                 <a14:useLocalDpi xmlns:a14="http://schemas.microsoft.com/office/drawing/2010/main" val="0"/>
@@ -7685,126 +8311,73 @@
           </a:extLst>
         </p:spPr>
       </p:pic>
-      <p:pic>
-        <p:nvPicPr>
-          <p:cNvPr id="5" name="Imagem 4" descr="Desenho de uma pessoa&#10;&#10;Descrição gerada automaticamente">
-            <a:extLst>
-              <a:ext uri="{FF2B5EF4-FFF2-40B4-BE49-F238E27FC236}">
-                <a16:creationId xmlns:a16="http://schemas.microsoft.com/office/drawing/2014/main" id="{65B6D792-5394-44C7-88F8-DC482A934804}"/>
-              </a:ext>
-            </a:extLst>
-          </p:cNvPr>
-          <p:cNvPicPr>
-            <a:picLocks noChangeAspect="1"/>
-          </p:cNvPicPr>
+      <p:sp>
+        <p:nvSpPr>
+          <p:cNvPr id="5" name="Retângulo 4"/>
+          <p:cNvSpPr/>
           <p:nvPr/>
-        </p:nvPicPr>
-        <p:blipFill>
-          <a:blip r:embed="rId3" cstate="print">
-            <a:extLst>
-              <a:ext uri="{28A0092B-C50C-407E-A947-70E740481C1C}">
-                <a14:useLocalDpi xmlns:a14="http://schemas.microsoft.com/office/drawing/2010/main" val="0"/>
-              </a:ext>
-            </a:extLst>
-          </a:blip>
-          <a:stretch>
-            <a:fillRect/>
-          </a:stretch>
-        </p:blipFill>
+        </p:nvSpPr>
         <p:spPr>
           <a:xfrm>
-            <a:off x="314370" y="4245753"/>
-            <a:ext cx="3084827" cy="2223170"/>
+            <a:off x="1791238" y="2329933"/>
+            <a:ext cx="4042891" cy="1785104"/>
           </a:xfrm>
           <a:prstGeom prst="rect">
             <a:avLst/>
           </a:prstGeom>
         </p:spPr>
-      </p:pic>
-      <p:sp>
-        <p:nvSpPr>
-          <p:cNvPr id="8" name="AutoShape 4">
-            <a:extLst>
-              <a:ext uri="{FF2B5EF4-FFF2-40B4-BE49-F238E27FC236}">
-                <a16:creationId xmlns:a16="http://schemas.microsoft.com/office/drawing/2014/main" id="{CBC49F37-024F-43BA-BF41-65835263DDCC}"/>
-              </a:ext>
-            </a:extLst>
-          </p:cNvPr>
-          <p:cNvSpPr>
-            <a:spLocks noChangeAspect="1" noChangeArrowheads="1"/>
-          </p:cNvSpPr>
-          <p:nvPr/>
-        </p:nvSpPr>
-        <p:spPr bwMode="auto">
-          <a:xfrm>
-            <a:off x="5943600" y="3276600"/>
-            <a:ext cx="304800" cy="304800"/>
-          </a:xfrm>
-          <a:prstGeom prst="rect">
-            <a:avLst/>
-          </a:prstGeom>
-          <a:noFill/>
-          <a:extLst>
-            <a:ext uri="{909E8E84-426E-40DD-AFC4-6F175D3DCCD1}">
-              <a14:hiddenFill xmlns:a14="http://schemas.microsoft.com/office/drawing/2010/main">
-                <a:solidFill>
-                  <a:srgbClr val="FFFFFF"/>
-                </a:solidFill>
-              </a14:hiddenFill>
-            </a:ext>
-          </a:extLst>
-        </p:spPr>
         <p:txBody>
-          <a:bodyPr vert="horz" wrap="square" lIns="91440" tIns="45720" rIns="91440" bIns="45720" numCol="1" anchor="t" anchorCtr="0" compatLnSpc="1">
-            <a:prstTxWarp prst="textNoShape">
-              <a:avLst/>
-            </a:prstTxWarp>
+          <a:bodyPr wrap="square">
+            <a:spAutoFit/>
           </a:bodyPr>
           <a:lstStyle/>
           <a:p>
-            <a:endParaRPr lang="pt-BR"/>
+            <a:endParaRPr lang="pt-BR" sz="2800" dirty="0">
+              <a:latin typeface="Bariol Bold" panose="02000506040000020003"/>
+            </a:endParaRPr>
+          </a:p>
+          <a:p>
+            <a:pPr marL="285750" indent="-285750">
+              <a:buFont typeface="Wingdings" panose="05000000000000000000" pitchFamily="2" charset="2"/>
+              <a:buChar char="ü"/>
+            </a:pPr>
+            <a:endParaRPr lang="pt-BR" sz="2800" dirty="0">
+              <a:latin typeface="Bariol Bold" panose="02000506040000020003"/>
+            </a:endParaRPr>
+          </a:p>
+          <a:p>
+            <a:pPr marL="285750" indent="-285750">
+              <a:buFont typeface="Wingdings" panose="05000000000000000000" pitchFamily="2" charset="2"/>
+              <a:buChar char="ü"/>
+            </a:pPr>
+            <a:endParaRPr lang="pt-BR" dirty="0">
+              <a:latin typeface="Bariol Bold" panose="02000506040000020003"/>
+            </a:endParaRPr>
+          </a:p>
+          <a:p>
+            <a:pPr marL="285750" indent="-285750">
+              <a:buFont typeface="Wingdings" panose="05000000000000000000" pitchFamily="2" charset="2"/>
+              <a:buChar char="ü"/>
+            </a:pPr>
+            <a:endParaRPr lang="pt-BR" dirty="0">
+              <a:latin typeface="Bariol Bold" panose="02000506040000020003"/>
+            </a:endParaRPr>
+          </a:p>
+          <a:p>
+            <a:pPr marL="285750" indent="-285750">
+              <a:buFont typeface="Wingdings" panose="05000000000000000000" pitchFamily="2" charset="2"/>
+              <a:buChar char="ü"/>
+            </a:pPr>
+            <a:endParaRPr lang="pt-BR" dirty="0">
+              <a:latin typeface="Bariol Bold" panose="02000506040000020003"/>
+            </a:endParaRPr>
           </a:p>
         </p:txBody>
       </p:sp>
-      <p:pic>
-        <p:nvPicPr>
-          <p:cNvPr id="10" name="Imagem 9" descr="Diagrama&#10;&#10;Descrição gerada automaticamente">
-            <a:extLst>
-              <a:ext uri="{FF2B5EF4-FFF2-40B4-BE49-F238E27FC236}">
-                <a16:creationId xmlns:a16="http://schemas.microsoft.com/office/drawing/2014/main" id="{EC31F9B0-BA3A-445B-901B-FC2332FEF663}"/>
-              </a:ext>
-            </a:extLst>
-          </p:cNvPr>
-          <p:cNvPicPr>
-            <a:picLocks noChangeAspect="1"/>
-          </p:cNvPicPr>
-          <p:nvPr/>
-        </p:nvPicPr>
-        <p:blipFill rotWithShape="1">
-          <a:blip r:embed="rId4">
-            <a:extLst>
-              <a:ext uri="{28A0092B-C50C-407E-A947-70E740481C1C}">
-                <a14:useLocalDpi xmlns:a14="http://schemas.microsoft.com/office/drawing/2010/main" val="0"/>
-              </a:ext>
-            </a:extLst>
-          </a:blip>
-          <a:srcRect t="488"/>
-          <a:stretch/>
-        </p:blipFill>
-        <p:spPr>
-          <a:xfrm>
-            <a:off x="3021496" y="1263653"/>
-            <a:ext cx="6705600" cy="5260624"/>
-          </a:xfrm>
-          <a:prstGeom prst="rect">
-            <a:avLst/>
-          </a:prstGeom>
-        </p:spPr>
-      </p:pic>
     </p:spTree>
     <p:extLst>
       <p:ext uri="{BB962C8B-B14F-4D97-AF65-F5344CB8AC3E}">
-        <p14:creationId xmlns:p14="http://schemas.microsoft.com/office/powerpoint/2010/main" val="386722973"/>
+        <p14:creationId xmlns:p14="http://schemas.microsoft.com/office/powerpoint/2010/main" val="1996836133"/>
       </p:ext>
     </p:extLst>
   </p:cSld>
@@ -7847,7 +8420,7 @@
                             </p:stCondLst>
                             <p:childTnLst>
                               <p:par>
-                                <p:cTn id="5" presetID="10" presetClass="entr" presetSubtype="0" fill="hold" grpId="0" nodeType="withEffect">
+                                <p:cTn id="5" presetID="10" presetClass="entr" presetSubtype="0" fill="hold" grpId="0" nodeType="afterEffect">
                                   <p:stCondLst>
                                     <p:cond delay="0"/>
                                   </p:stCondLst>
@@ -7919,7 +8492,7 @@
                               <p:par>
                                 <p:cTn id="11" presetID="10" presetClass="entr" presetSubtype="0" fill="hold" nodeType="withEffect">
                                   <p:stCondLst>
-                                    <p:cond delay="250"/>
+                                    <p:cond delay="0"/>
                                   </p:stCondLst>
                                   <p:childTnLst>
                                     <p:set>
@@ -7930,7 +8503,7 @@
                                           </p:stCondLst>
                                         </p:cTn>
                                         <p:tgtEl>
-                                          <p:spTgt spid="5"/>
+                                          <p:spTgt spid="4"/>
                                         </p:tgtEl>
                                         <p:attrNameLst>
                                           <p:attrName>style.visibility</p:attrName>
@@ -7944,7 +8517,7 @@
                                       <p:cBhvr>
                                         <p:cTn id="13" dur="500"/>
                                         <p:tgtEl>
-                                          <p:spTgt spid="5"/>
+                                          <p:spTgt spid="4"/>
                                         </p:tgtEl>
                                       </p:cBhvr>
                                     </p:animEffect>
@@ -7954,7 +8527,7 @@
                               <p:par>
                                 <p:cTn id="14" presetID="10" presetClass="entr" presetSubtype="0" fill="hold" nodeType="withEffect">
                                   <p:stCondLst>
-                                    <p:cond delay="250"/>
+                                    <p:cond delay="0"/>
                                   </p:stCondLst>
                                   <p:childTnLst>
                                     <p:set>
@@ -7965,7 +8538,7 @@
                                           </p:stCondLst>
                                         </p:cTn>
                                         <p:tgtEl>
-                                          <p:spTgt spid="4"/>
+                                          <p:spTgt spid="2"/>
                                         </p:tgtEl>
                                         <p:attrNameLst>
                                           <p:attrName>style.visibility</p:attrName>
@@ -7979,7 +8552,7 @@
                                       <p:cBhvr>
                                         <p:cTn id="16" dur="500"/>
                                         <p:tgtEl>
-                                          <p:spTgt spid="4"/>
+                                          <p:spTgt spid="2"/>
                                         </p:tgtEl>
                                       </p:cBhvr>
                                     </p:animEffect>
@@ -7987,10 +8560,15 @@
                                 </p:cTn>
                               </p:par>
                               <p:par>
-                                <p:cTn id="17" presetID="10" presetClass="entr" presetSubtype="0" fill="hold" nodeType="withEffect">
+                                <p:cTn id="17" presetID="10" presetClass="entr" presetSubtype="0" fill="hold" grpId="0" nodeType="withEffect" nodePh="1">
                                   <p:stCondLst>
-                                    <p:cond delay="250"/>
+                                    <p:cond delay="0"/>
                                   </p:stCondLst>
+                                  <p:endCondLst>
+                                    <p:cond evt="begin" delay="0">
+                                      <p:tn val="17"/>
+                                    </p:cond>
+                                  </p:endCondLst>
                                   <p:childTnLst>
                                     <p:set>
                                       <p:cBhvr>
@@ -8000,7 +8578,7 @@
                                           </p:stCondLst>
                                         </p:cTn>
                                         <p:tgtEl>
-                                          <p:spTgt spid="10"/>
+                                          <p:spTgt spid="5"/>
                                         </p:tgtEl>
                                         <p:attrNameLst>
                                           <p:attrName>style.visibility</p:attrName>
@@ -8014,7 +8592,7 @@
                                       <p:cBhvr>
                                         <p:cTn id="19" dur="500"/>
                                         <p:tgtEl>
-                                          <p:spTgt spid="10"/>
+                                          <p:spTgt spid="5"/>
                                         </p:tgtEl>
                                       </p:cBhvr>
                                     </p:animEffect>
@@ -8050,6 +8628,7 @@
     </p:tnLst>
     <p:bldLst>
       <p:bldP spid="7" grpId="0"/>
+      <p:bldP spid="5" grpId="0"/>
     </p:bldLst>
   </p:timing>
 </p:sld>
@@ -8165,51 +8744,9 @@
             <a:pPr algn="ctr"/>
             <a:r>
               <a:rPr lang="pt-BR" dirty="0">
-                <a:solidFill>
-                  <a:schemeClr val="tx1">
-                    <a:lumMod val="75000"/>
-                    <a:lumOff val="25000"/>
-                  </a:schemeClr>
-                </a:solidFill>
-                <a:latin typeface="Bariol Bold" panose="02000506040000020003" pitchFamily="2" charset="0"/>
+                <a:latin typeface="Bariol Bold" panose="02000506040000020003"/>
               </a:rPr>
-              <a:t>Inovação </a:t>
-            </a:r>
-            <a:r>
-              <a:rPr lang="pt-BR" dirty="0" err="1">
-                <a:solidFill>
-                  <a:schemeClr val="tx1">
-                    <a:lumMod val="75000"/>
-                    <a:lumOff val="25000"/>
-                  </a:schemeClr>
-                </a:solidFill>
-                <a:latin typeface="Bariol Bold" panose="02000506040000020003" pitchFamily="2" charset="0"/>
-              </a:rPr>
-              <a:t>Deep</a:t>
-            </a:r>
-            <a:r>
-              <a:rPr lang="pt-BR" dirty="0">
-                <a:solidFill>
-                  <a:schemeClr val="tx1">
-                    <a:lumMod val="75000"/>
-                    <a:lumOff val="25000"/>
-                  </a:schemeClr>
-                </a:solidFill>
-                <a:latin typeface="Bariol Bold" panose="02000506040000020003" pitchFamily="2" charset="0"/>
-              </a:rPr>
-              <a:t> </a:t>
-            </a:r>
-            <a:r>
-              <a:rPr lang="pt-BR" dirty="0" err="1">
-                <a:solidFill>
-                  <a:schemeClr val="tx1">
-                    <a:lumMod val="75000"/>
-                    <a:lumOff val="25000"/>
-                  </a:schemeClr>
-                </a:solidFill>
-                <a:latin typeface="Bariol Bold" panose="02000506040000020003" pitchFamily="2" charset="0"/>
-              </a:rPr>
-              <a:t>Dive</a:t>
+              <a:t> Gotas de Incentivo</a:t>
             </a:r>
             <a:endParaRPr lang="pt-BR" dirty="0">
               <a:solidFill>
@@ -8314,8 +8851,8 @@
         </p:nvSpPr>
         <p:spPr>
           <a:xfrm>
-            <a:off x="1791238" y="2329933"/>
-            <a:ext cx="4042891" cy="2492990"/>
+            <a:off x="764268" y="2329933"/>
+            <a:ext cx="5331732" cy="1354217"/>
           </a:xfrm>
           <a:prstGeom prst="rect">
             <a:avLst/>
@@ -8327,45 +8864,6 @@
           </a:bodyPr>
           <a:lstStyle/>
           <a:p>
-            <a:pPr marL="285750" indent="-285750">
-              <a:buFont typeface="Wingdings" panose="05000000000000000000" pitchFamily="2" charset="2"/>
-              <a:buChar char="ü"/>
-            </a:pPr>
-            <a:r>
-              <a:rPr lang="pt-BR" sz="2800" dirty="0">
-                <a:latin typeface="Bariol Bold" panose="02000506040000020003"/>
-              </a:rPr>
-              <a:t> Pausas – NR-17</a:t>
-            </a:r>
-            <a:r>
-              <a:rPr lang="pt-BR" dirty="0">
-                <a:latin typeface="Bariol Bold" panose="02000506040000020003"/>
-              </a:rPr>
-              <a:t>;</a:t>
-            </a:r>
-          </a:p>
-          <a:p>
-            <a:endParaRPr lang="pt-BR" dirty="0">
-              <a:latin typeface="Bariol Bold" panose="02000506040000020003"/>
-            </a:endParaRPr>
-          </a:p>
-          <a:p>
-            <a:pPr marL="285750" indent="-285750">
-              <a:buFont typeface="Wingdings" panose="05000000000000000000" pitchFamily="2" charset="2"/>
-              <a:buChar char="ü"/>
-            </a:pPr>
-            <a:r>
-              <a:rPr lang="pt-BR" sz="2800" dirty="0">
-                <a:latin typeface="Bariol Bold" panose="02000506040000020003"/>
-              </a:rPr>
-              <a:t> Gotas de Incentivo;</a:t>
-            </a:r>
-          </a:p>
-          <a:p>
-            <a:pPr marL="285750" indent="-285750">
-              <a:buFont typeface="Wingdings" panose="05000000000000000000" pitchFamily="2" charset="2"/>
-              <a:buChar char="ü"/>
-            </a:pPr>
             <a:endParaRPr lang="pt-BR" sz="2800" dirty="0">
               <a:latin typeface="Bariol Bold" panose="02000506040000020003"/>
             </a:endParaRPr>
@@ -8402,7 +8900,7 @@
     </p:spTree>
     <p:extLst>
       <p:ext uri="{BB962C8B-B14F-4D97-AF65-F5344CB8AC3E}">
-        <p14:creationId xmlns:p14="http://schemas.microsoft.com/office/powerpoint/2010/main" val="1996836133"/>
+        <p14:creationId xmlns:p14="http://schemas.microsoft.com/office/powerpoint/2010/main" val="3013284141"/>
       </p:ext>
     </p:extLst>
   </p:cSld>
@@ -8585,10 +9083,15 @@
                                 </p:cTn>
                               </p:par>
                               <p:par>
-                                <p:cTn id="17" presetID="10" presetClass="entr" presetSubtype="0" fill="hold" grpId="0" nodeType="withEffect">
+                                <p:cTn id="17" presetID="10" presetClass="entr" presetSubtype="0" fill="hold" grpId="0" nodeType="withEffect" nodePh="1">
                                   <p:stCondLst>
                                     <p:cond delay="0"/>
                                   </p:stCondLst>
+                                  <p:endCondLst>
+                                    <p:cond evt="begin" delay="0">
+                                      <p:tn val="17"/>
+                                    </p:cond>
+                                  </p:endCondLst>
                                   <p:childTnLst>
                                     <p:set>
                                       <p:cBhvr>
@@ -10327,8 +10830,8 @@
         </p:nvSpPr>
         <p:spPr>
           <a:xfrm>
-            <a:off x="838200" y="-19310"/>
-            <a:ext cx="10515600" cy="1213142"/>
+            <a:off x="838200" y="-160017"/>
+            <a:ext cx="10515600" cy="1325563"/>
           </a:xfrm>
           <a:prstGeom prst="rect">
             <a:avLst/>
@@ -10369,17 +10872,17 @@
                 </a:solidFill>
                 <a:latin typeface="Bariol Bold" panose="02000506040000020003" pitchFamily="2" charset="0"/>
               </a:rPr>
-              <a:t>Diagrama de Classe</a:t>
+              <a:t>Aplicação Java</a:t>
             </a:r>
           </a:p>
         </p:txBody>
       </p:sp>
       <p:pic>
         <p:nvPicPr>
-          <p:cNvPr id="5" name="Picture 2">
+          <p:cNvPr id="4" name="Picture 2">
             <a:extLst>
               <a:ext uri="{FF2B5EF4-FFF2-40B4-BE49-F238E27FC236}">
-                <a16:creationId xmlns:a16="http://schemas.microsoft.com/office/drawing/2014/main" id="{5E6A065D-74B6-43C9-8951-4759FD99C85F}"/>
+                <a16:creationId xmlns:a16="http://schemas.microsoft.com/office/drawing/2014/main" id="{3CF36ED0-FCD8-45D8-A912-5D4DD5032DBE}"/>
               </a:ext>
             </a:extLst>
           </p:cNvPr>
@@ -10426,7 +10929,7 @@
           <p:cNvPr id="2" name="Straight Arrow Connector 1">
             <a:extLst>
               <a:ext uri="{FF2B5EF4-FFF2-40B4-BE49-F238E27FC236}">
-                <a16:creationId xmlns:a16="http://schemas.microsoft.com/office/drawing/2014/main" id="{102C7A15-5BE4-4E8E-826E-06C7E84CB27C}"/>
+                <a16:creationId xmlns:a16="http://schemas.microsoft.com/office/drawing/2014/main" id="{EF6676ED-9702-4820-B9D8-8B178C2BC9D8}"/>
               </a:ext>
             </a:extLst>
           </p:cNvPr>
@@ -10437,8 +10940,8 @@
         </p:nvCxnSpPr>
         <p:spPr>
           <a:xfrm>
-            <a:off x="3737113" y="838200"/>
-            <a:ext cx="4717774" cy="0"/>
+            <a:off x="4187687" y="777737"/>
+            <a:ext cx="3697356" cy="0"/>
           </a:xfrm>
           <a:prstGeom prst="straightConnector1">
             <a:avLst/>
@@ -10466,34 +10969,22 @@
       </p:cxnSp>
       <p:pic>
         <p:nvPicPr>
-          <p:cNvPr id="8" name="Imagem 7" descr="Uma imagem contendo Linha do tempo&#10;&#10;Descrição gerada automaticamente">
-            <a:extLst>
-              <a:ext uri="{FF2B5EF4-FFF2-40B4-BE49-F238E27FC236}">
-                <a16:creationId xmlns:a16="http://schemas.microsoft.com/office/drawing/2014/main" id="{886D92C6-8ADC-4806-BC55-A75E6623F3AA}"/>
-              </a:ext>
-            </a:extLst>
-          </p:cNvPr>
+          <p:cNvPr id="3" name="Imagem 2"/>
           <p:cNvPicPr>
             <a:picLocks noChangeAspect="1"/>
           </p:cNvPicPr>
           <p:nvPr/>
         </p:nvPicPr>
         <p:blipFill>
-          <a:blip r:embed="rId3" cstate="print">
-            <a:extLst>
-              <a:ext uri="{28A0092B-C50C-407E-A947-70E740481C1C}">
-                <a14:useLocalDpi xmlns:a14="http://schemas.microsoft.com/office/drawing/2010/main" val="0"/>
-              </a:ext>
-            </a:extLst>
-          </a:blip>
+          <a:blip r:embed="rId3"/>
           <a:stretch>
             <a:fillRect/>
           </a:stretch>
         </p:blipFill>
         <p:spPr>
           <a:xfrm>
-            <a:off x="1036125" y="979821"/>
-            <a:ext cx="10119749" cy="5878179"/>
+            <a:off x="1842473" y="1165546"/>
+            <a:ext cx="8891789" cy="4327337"/>
           </a:xfrm>
           <a:prstGeom prst="rect">
             <a:avLst/>
@@ -10503,7 +10994,7 @@
     </p:spTree>
     <p:extLst>
       <p:ext uri="{BB962C8B-B14F-4D97-AF65-F5344CB8AC3E}">
-        <p14:creationId xmlns:p14="http://schemas.microsoft.com/office/powerpoint/2010/main" val="1994396839"/>
+        <p14:creationId xmlns:p14="http://schemas.microsoft.com/office/powerpoint/2010/main" val="3553014712"/>
       </p:ext>
     </p:extLst>
   </p:cSld>
@@ -10594,7 +11085,7 @@
                                           </p:stCondLst>
                                         </p:cTn>
                                         <p:tgtEl>
-                                          <p:spTgt spid="5"/>
+                                          <p:spTgt spid="4"/>
                                         </p:tgtEl>
                                         <p:attrNameLst>
                                           <p:attrName>style.visibility</p:attrName>
@@ -10608,7 +11099,7 @@
                                       <p:cBhvr>
                                         <p:cTn id="10" dur="500"/>
                                         <p:tgtEl>
-                                          <p:spTgt spid="5"/>
+                                          <p:spTgt spid="4"/>
                                         </p:tgtEl>
                                       </p:cBhvr>
                                     </p:animEffect>
@@ -10618,7 +11109,7 @@
                               <p:par>
                                 <p:cTn id="11" presetID="10" presetClass="entr" presetSubtype="0" fill="hold" nodeType="withEffect">
                                   <p:stCondLst>
-                                    <p:cond delay="250"/>
+                                    <p:cond delay="0"/>
                                   </p:stCondLst>
                                   <p:childTnLst>
                                     <p:set>
@@ -10644,6 +11135,41 @@
                                         <p:cTn id="13" dur="500"/>
                                         <p:tgtEl>
                                           <p:spTgt spid="2"/>
+                                        </p:tgtEl>
+                                      </p:cBhvr>
+                                    </p:animEffect>
+                                  </p:childTnLst>
+                                </p:cTn>
+                              </p:par>
+                              <p:par>
+                                <p:cTn id="14" presetID="10" presetClass="entr" presetSubtype="0" fill="hold" nodeType="withEffect">
+                                  <p:stCondLst>
+                                    <p:cond delay="0"/>
+                                  </p:stCondLst>
+                                  <p:childTnLst>
+                                    <p:set>
+                                      <p:cBhvr>
+                                        <p:cTn id="15" dur="1" fill="hold">
+                                          <p:stCondLst>
+                                            <p:cond delay="0"/>
+                                          </p:stCondLst>
+                                        </p:cTn>
+                                        <p:tgtEl>
+                                          <p:spTgt spid="3"/>
+                                        </p:tgtEl>
+                                        <p:attrNameLst>
+                                          <p:attrName>style.visibility</p:attrName>
+                                        </p:attrNameLst>
+                                      </p:cBhvr>
+                                      <p:to>
+                                        <p:strVal val="visible"/>
+                                      </p:to>
+                                    </p:set>
+                                    <p:animEffect transition="in" filter="fade">
+                                      <p:cBhvr>
+                                        <p:cTn id="16" dur="500"/>
+                                        <p:tgtEl>
+                                          <p:spTgt spid="3"/>
                                         </p:tgtEl>
                                       </p:cBhvr>
                                     </p:animEffect>

</xml_diff>

<commit_message>
Colocando link do projeto no slide
</commit_message>
<xml_diff>
--- a/Documentação/Slide Final.pptx
+++ b/Documentação/Slide Final.pptx
@@ -17,6 +17,7 @@
     <p:sldId id="311" r:id="rId11"/>
     <p:sldId id="284" r:id="rId12"/>
     <p:sldId id="292" r:id="rId13"/>
+    <p:sldId id="314" r:id="rId14"/>
   </p:sldIdLst>
   <p:sldSz cx="12192000" cy="6858000"/>
   <p:notesSz cx="6858000" cy="9144000"/>
@@ -371,7 +372,7 @@
           <a:p>
             <a:fld id="{F50B35C2-D55D-43EC-A9F9-87B33DB15AB7}" type="datetimeFigureOut">
               <a:rPr lang="pt-BR" smtClean="0"/>
-              <a:t>09/12/2020</a:t>
+              <a:t>16/12/2020</a:t>
             </a:fld>
             <a:endParaRPr lang="pt-BR"/>
           </a:p>
@@ -539,7 +540,7 @@
           <a:p>
             <a:fld id="{F50B35C2-D55D-43EC-A9F9-87B33DB15AB7}" type="datetimeFigureOut">
               <a:rPr lang="pt-BR" smtClean="0"/>
-              <a:t>09/12/2020</a:t>
+              <a:t>16/12/2020</a:t>
             </a:fld>
             <a:endParaRPr lang="pt-BR"/>
           </a:p>
@@ -717,7 +718,7 @@
           <a:p>
             <a:fld id="{F50B35C2-D55D-43EC-A9F9-87B33DB15AB7}" type="datetimeFigureOut">
               <a:rPr lang="pt-BR" smtClean="0"/>
-              <a:t>09/12/2020</a:t>
+              <a:t>16/12/2020</a:t>
             </a:fld>
             <a:endParaRPr lang="pt-BR"/>
           </a:p>
@@ -885,7 +886,7 @@
           <a:p>
             <a:fld id="{F50B35C2-D55D-43EC-A9F9-87B33DB15AB7}" type="datetimeFigureOut">
               <a:rPr lang="pt-BR" smtClean="0"/>
-              <a:t>09/12/2020</a:t>
+              <a:t>16/12/2020</a:t>
             </a:fld>
             <a:endParaRPr lang="pt-BR"/>
           </a:p>
@@ -1130,7 +1131,7 @@
           <a:p>
             <a:fld id="{F50B35C2-D55D-43EC-A9F9-87B33DB15AB7}" type="datetimeFigureOut">
               <a:rPr lang="pt-BR" smtClean="0"/>
-              <a:t>09/12/2020</a:t>
+              <a:t>16/12/2020</a:t>
             </a:fld>
             <a:endParaRPr lang="pt-BR"/>
           </a:p>
@@ -1359,7 +1360,7 @@
           <a:p>
             <a:fld id="{F50B35C2-D55D-43EC-A9F9-87B33DB15AB7}" type="datetimeFigureOut">
               <a:rPr lang="pt-BR" smtClean="0"/>
-              <a:t>09/12/2020</a:t>
+              <a:t>16/12/2020</a:t>
             </a:fld>
             <a:endParaRPr lang="pt-BR"/>
           </a:p>
@@ -1723,7 +1724,7 @@
           <a:p>
             <a:fld id="{F50B35C2-D55D-43EC-A9F9-87B33DB15AB7}" type="datetimeFigureOut">
               <a:rPr lang="pt-BR" smtClean="0"/>
-              <a:t>09/12/2020</a:t>
+              <a:t>16/12/2020</a:t>
             </a:fld>
             <a:endParaRPr lang="pt-BR"/>
           </a:p>
@@ -1840,7 +1841,7 @@
           <a:p>
             <a:fld id="{F50B35C2-D55D-43EC-A9F9-87B33DB15AB7}" type="datetimeFigureOut">
               <a:rPr lang="pt-BR" smtClean="0"/>
-              <a:t>09/12/2020</a:t>
+              <a:t>16/12/2020</a:t>
             </a:fld>
             <a:endParaRPr lang="pt-BR"/>
           </a:p>
@@ -1935,7 +1936,7 @@
           <a:p>
             <a:fld id="{F50B35C2-D55D-43EC-A9F9-87B33DB15AB7}" type="datetimeFigureOut">
               <a:rPr lang="pt-BR" smtClean="0"/>
-              <a:t>09/12/2020</a:t>
+              <a:t>16/12/2020</a:t>
             </a:fld>
             <a:endParaRPr lang="pt-BR"/>
           </a:p>
@@ -2210,7 +2211,7 @@
           <a:p>
             <a:fld id="{F50B35C2-D55D-43EC-A9F9-87B33DB15AB7}" type="datetimeFigureOut">
               <a:rPr lang="pt-BR" smtClean="0"/>
-              <a:t>09/12/2020</a:t>
+              <a:t>16/12/2020</a:t>
             </a:fld>
             <a:endParaRPr lang="pt-BR"/>
           </a:p>
@@ -2462,7 +2463,7 @@
           <a:p>
             <a:fld id="{F50B35C2-D55D-43EC-A9F9-87B33DB15AB7}" type="datetimeFigureOut">
               <a:rPr lang="pt-BR" smtClean="0"/>
-              <a:t>09/12/2020</a:t>
+              <a:t>16/12/2020</a:t>
             </a:fld>
             <a:endParaRPr lang="pt-BR"/>
           </a:p>
@@ -2673,7 +2674,7 @@
           <a:p>
             <a:fld id="{F50B35C2-D55D-43EC-A9F9-87B33DB15AB7}" type="datetimeFigureOut">
               <a:rPr lang="pt-BR" smtClean="0"/>
-              <a:t>09/12/2020</a:t>
+              <a:t>16/12/2020</a:t>
             </a:fld>
             <a:endParaRPr lang="pt-BR"/>
           </a:p>
@@ -3386,7 +3387,7 @@
         </p:spPr>
         <p:txBody>
           <a:bodyPr vert="horz" lIns="91440" tIns="45720" rIns="91440" bIns="45720" rtlCol="0" anchor="ctr">
-            <a:normAutofit fontScale="92500"/>
+            <a:normAutofit/>
           </a:bodyPr>
           <a:lstStyle>
             <a:lvl1pPr algn="l" defTabSz="914400" rtl="0" eaLnBrk="1" latinLnBrk="0" hangingPunct="1">
@@ -4626,6 +4627,247 @@
     <p:bldLst>
       <p:bldP spid="7" grpId="0"/>
     </p:bldLst>
+  </p:timing>
+</p:sld>
+</file>
+
+<file path=ppt/slides/slide13.xml><?xml version="1.0" encoding="utf-8"?>
+<p:sld xmlns:a="http://schemas.openxmlformats.org/drawingml/2006/main" xmlns:r="http://schemas.openxmlformats.org/officeDocument/2006/relationships" xmlns:p="http://schemas.openxmlformats.org/presentationml/2006/main">
+  <p:cSld>
+    <p:spTree>
+      <p:nvGrpSpPr>
+        <p:cNvPr id="1" name=""/>
+        <p:cNvGrpSpPr/>
+        <p:nvPr/>
+      </p:nvGrpSpPr>
+      <p:grpSpPr>
+        <a:xfrm>
+          <a:off x="0" y="0"/>
+          <a:ext cx="0" cy="0"/>
+          <a:chOff x="0" y="0"/>
+          <a:chExt cx="0" cy="0"/>
+        </a:xfrm>
+      </p:grpSpPr>
+      <p:sp>
+        <p:nvSpPr>
+          <p:cNvPr id="2" name="Título 1"/>
+          <p:cNvSpPr>
+            <a:spLocks noGrp="1"/>
+          </p:cNvSpPr>
+          <p:nvPr>
+            <p:ph type="title"/>
+          </p:nvPr>
+        </p:nvSpPr>
+        <p:spPr/>
+        <p:txBody>
+          <a:bodyPr/>
+          <a:lstStyle/>
+          <a:p>
+            <a:r>
+              <a:rPr lang="pt-BR" dirty="0" smtClean="0">
+                <a:solidFill>
+                  <a:schemeClr val="tx1">
+                    <a:lumMod val="75000"/>
+                    <a:lumOff val="25000"/>
+                  </a:schemeClr>
+                </a:solidFill>
+                <a:latin typeface="Bariol Bold" panose="02000506040000020003" pitchFamily="2" charset="0"/>
+              </a:rPr>
+              <a:t>                                       Link</a:t>
+            </a:r>
+            <a:r>
+              <a:rPr lang="pt-BR" dirty="0">
+                <a:solidFill>
+                  <a:schemeClr val="tx1">
+                    <a:lumMod val="75000"/>
+                    <a:lumOff val="25000"/>
+                  </a:schemeClr>
+                </a:solidFill>
+                <a:latin typeface="Bariol Bold" panose="02000506040000020003" pitchFamily="2" charset="0"/>
+              </a:rPr>
+              <a:t/>
+            </a:r>
+            <a:br>
+              <a:rPr lang="pt-BR" dirty="0">
+                <a:solidFill>
+                  <a:schemeClr val="tx1">
+                    <a:lumMod val="75000"/>
+                    <a:lumOff val="25000"/>
+                  </a:schemeClr>
+                </a:solidFill>
+                <a:latin typeface="Bariol Bold" panose="02000506040000020003" pitchFamily="2" charset="0"/>
+              </a:rPr>
+            </a:br>
+            <a:endParaRPr lang="pt-BR" dirty="0"/>
+          </a:p>
+        </p:txBody>
+      </p:sp>
+      <p:sp>
+        <p:nvSpPr>
+          <p:cNvPr id="3" name="Espaço Reservado para Conteúdo 2"/>
+          <p:cNvSpPr>
+            <a:spLocks noGrp="1"/>
+          </p:cNvSpPr>
+          <p:nvPr>
+            <p:ph idx="1"/>
+          </p:nvPr>
+        </p:nvSpPr>
+        <p:spPr/>
+        <p:txBody>
+          <a:bodyPr/>
+          <a:lstStyle/>
+          <a:p>
+            <a:r>
+              <a:rPr lang="pt-BR" dirty="0" smtClean="0"/>
+              <a:t>Link do </a:t>
+            </a:r>
+            <a:r>
+              <a:rPr lang="pt-BR" dirty="0" err="1" smtClean="0"/>
+              <a:t>Github</a:t>
+            </a:r>
+            <a:r>
+              <a:rPr lang="pt-BR" dirty="0"/>
+              <a:t>: https://github.com/BandTec/grupo-07-adsa-20201.git</a:t>
+            </a:r>
+          </a:p>
+        </p:txBody>
+      </p:sp>
+      <p:cxnSp>
+        <p:nvCxnSpPr>
+          <p:cNvPr id="4" name="Straight Arrow Connector 1">
+            <a:extLst>
+              <a:ext uri="{FF2B5EF4-FFF2-40B4-BE49-F238E27FC236}">
+                <a16:creationId xmlns="" xmlns:a16="http://schemas.microsoft.com/office/drawing/2014/main" id="{825D95E1-8250-4172-ABA3-976541C2807C}"/>
+              </a:ext>
+            </a:extLst>
+          </p:cNvPr>
+          <p:cNvCxnSpPr/>
+          <p:nvPr/>
+        </p:nvCxnSpPr>
+        <p:spPr>
+          <a:xfrm>
+            <a:off x="4752304" y="1024955"/>
+            <a:ext cx="1520915" cy="2951"/>
+          </a:xfrm>
+          <a:prstGeom prst="straightConnector1">
+            <a:avLst/>
+          </a:prstGeom>
+          <a:ln>
+            <a:solidFill>
+              <a:srgbClr val="C00000"/>
+            </a:solidFill>
+          </a:ln>
+        </p:spPr>
+        <p:style>
+          <a:lnRef idx="3">
+            <a:schemeClr val="dk1"/>
+          </a:lnRef>
+          <a:fillRef idx="0">
+            <a:schemeClr val="dk1"/>
+          </a:fillRef>
+          <a:effectRef idx="2">
+            <a:schemeClr val="dk1"/>
+          </a:effectRef>
+          <a:fontRef idx="minor">
+            <a:schemeClr val="tx1"/>
+          </a:fontRef>
+        </p:style>
+      </p:cxnSp>
+    </p:spTree>
+    <p:extLst>
+      <p:ext uri="{BB962C8B-B14F-4D97-AF65-F5344CB8AC3E}">
+        <p14:creationId xmlns:p14="http://schemas.microsoft.com/office/powerpoint/2010/main" val="4097507851"/>
+      </p:ext>
+    </p:extLst>
+  </p:cSld>
+  <p:clrMapOvr>
+    <a:masterClrMapping/>
+  </p:clrMapOvr>
+  <p:timing>
+    <p:tnLst>
+      <p:par>
+        <p:cTn id="1" dur="indefinite" restart="never" nodeType="tmRoot">
+          <p:childTnLst>
+            <p:seq concurrent="1" nextAc="seek">
+              <p:cTn id="2" dur="indefinite" nodeType="mainSeq">
+                <p:childTnLst>
+                  <p:par>
+                    <p:cTn id="3" fill="hold">
+                      <p:stCondLst>
+                        <p:cond delay="indefinite"/>
+                        <p:cond evt="onBegin" delay="0">
+                          <p:tn val="2"/>
+                        </p:cond>
+                      </p:stCondLst>
+                      <p:childTnLst>
+                        <p:par>
+                          <p:cTn id="4" fill="hold">
+                            <p:stCondLst>
+                              <p:cond delay="0"/>
+                            </p:stCondLst>
+                            <p:childTnLst>
+                              <p:par>
+                                <p:cTn id="5" presetID="10" presetClass="entr" presetSubtype="0" fill="hold" nodeType="withEffect">
+                                  <p:stCondLst>
+                                    <p:cond delay="0"/>
+                                  </p:stCondLst>
+                                  <p:childTnLst>
+                                    <p:set>
+                                      <p:cBhvr>
+                                        <p:cTn id="6" dur="1" fill="hold">
+                                          <p:stCondLst>
+                                            <p:cond delay="0"/>
+                                          </p:stCondLst>
+                                        </p:cTn>
+                                        <p:tgtEl>
+                                          <p:spTgt spid="4"/>
+                                        </p:tgtEl>
+                                        <p:attrNameLst>
+                                          <p:attrName>style.visibility</p:attrName>
+                                        </p:attrNameLst>
+                                      </p:cBhvr>
+                                      <p:to>
+                                        <p:strVal val="visible"/>
+                                      </p:to>
+                                    </p:set>
+                                    <p:animEffect transition="in" filter="fade">
+                                      <p:cBhvr>
+                                        <p:cTn id="7" dur="500"/>
+                                        <p:tgtEl>
+                                          <p:spTgt spid="4"/>
+                                        </p:tgtEl>
+                                      </p:cBhvr>
+                                    </p:animEffect>
+                                  </p:childTnLst>
+                                </p:cTn>
+                              </p:par>
+                            </p:childTnLst>
+                          </p:cTn>
+                        </p:par>
+                      </p:childTnLst>
+                    </p:cTn>
+                  </p:par>
+                </p:childTnLst>
+              </p:cTn>
+              <p:prevCondLst>
+                <p:cond evt="onPrev" delay="0">
+                  <p:tgtEl>
+                    <p:sldTgt/>
+                  </p:tgtEl>
+                </p:cond>
+              </p:prevCondLst>
+              <p:nextCondLst>
+                <p:cond evt="onNext" delay="0">
+                  <p:tgtEl>
+                    <p:sldTgt/>
+                  </p:tgtEl>
+                </p:cond>
+              </p:nextCondLst>
+            </p:seq>
+          </p:childTnLst>
+        </p:cTn>
+      </p:par>
+    </p:tnLst>
   </p:timing>
 </p:sld>
 </file>

</xml_diff>